<commit_message>
Agregada slide a la presentación (Proceso de ETL)
</commit_message>
<xml_diff>
--- a/G8DS.pptx
+++ b/G8DS.pptx
@@ -5,16 +5,17 @@
     <p:sldMasterId id="2147483660" r:id="rId1"/>
   </p:sldMasterIdLst>
   <p:notesMasterIdLst>
-    <p:notesMasterId r:id="rId9"/>
+    <p:notesMasterId r:id="rId10"/>
   </p:notesMasterIdLst>
   <p:sldIdLst>
     <p:sldId id="257" r:id="rId2"/>
     <p:sldId id="258" r:id="rId3"/>
     <p:sldId id="259" r:id="rId4"/>
-    <p:sldId id="261" r:id="rId5"/>
-    <p:sldId id="263" r:id="rId6"/>
-    <p:sldId id="262" r:id="rId7"/>
-    <p:sldId id="260" r:id="rId8"/>
+    <p:sldId id="264" r:id="rId5"/>
+    <p:sldId id="261" r:id="rId6"/>
+    <p:sldId id="263" r:id="rId7"/>
+    <p:sldId id="262" r:id="rId8"/>
+    <p:sldId id="260" r:id="rId9"/>
   </p:sldIdLst>
   <p:sldSz cx="12192000" cy="6858000"/>
   <p:notesSz cx="6858000" cy="9144000"/>
@@ -113,6 +114,11 @@
       </a:defRPr>
     </a:lvl9pPr>
   </p:defaultTextStyle>
+  <p:extLst>
+    <p:ext uri="{EFAFB233-063F-42B5-8137-9DF3F51BA10A}">
+      <p15:sldGuideLst xmlns:p15="http://schemas.microsoft.com/office/powerpoint/2012/main"/>
+    </p:ext>
+  </p:extLst>
 </p:presentation>
 </file>
 
@@ -198,7 +204,7 @@
           <a:p>
             <a:fld id="{93DB24D8-930E-49C9-8556-5263DB2E7666}" type="datetimeFigureOut">
               <a:rPr lang="es-ES" smtClean="0"/>
-              <a:t>20/04/2019</a:t>
+              <a:t>25/04/2019</a:t>
             </a:fld>
             <a:endParaRPr lang="es-ES"/>
           </a:p>
@@ -22348,6 +22354,36 @@
 </p:sldLayout>
 </file>
 
+<file path=ppt/slideLayouts/slideLayout14.xml><?xml version="1.0" encoding="utf-8"?>
+<p:sldLayout xmlns:a="http://schemas.openxmlformats.org/drawingml/2006/main" xmlns:r="http://schemas.openxmlformats.org/officeDocument/2006/relationships" xmlns:p="http://schemas.openxmlformats.org/presentationml/2006/main" type="blank">
+  <p:cSld name="1_Blank Slide">
+    <p:spTree>
+      <p:nvGrpSpPr>
+        <p:cNvPr id="1" name=""/>
+        <p:cNvGrpSpPr/>
+        <p:nvPr/>
+      </p:nvGrpSpPr>
+      <p:grpSpPr>
+        <a:xfrm>
+          <a:off x="0" y="0"/>
+          <a:ext cx="0" cy="0"/>
+          <a:chOff x="0" y="0"/>
+          <a:chExt cx="0" cy="0"/>
+        </a:xfrm>
+      </p:grpSpPr>
+    </p:spTree>
+    <p:extLst>
+      <p:ext uri="{BB962C8B-B14F-4D97-AF65-F5344CB8AC3E}">
+        <p14:creationId xmlns:p14="http://schemas.microsoft.com/office/powerpoint/2010/main" val="1920385785"/>
+      </p:ext>
+    </p:extLst>
+  </p:cSld>
+  <p:clrMapOvr>
+    <a:masterClrMapping/>
+  </p:clrMapOvr>
+</p:sldLayout>
+</file>
+
 <file path=ppt/slideLayouts/slideLayout2.xml><?xml version="1.0" encoding="utf-8"?>
 <p:sldLayout xmlns:a="http://schemas.openxmlformats.org/drawingml/2006/main" xmlns:r="http://schemas.openxmlformats.org/officeDocument/2006/relationships" xmlns:p="http://schemas.openxmlformats.org/presentationml/2006/main" matchingName="Title Slide" type="title">
   <p:cSld name="Title Slide">
@@ -29456,7 +29492,7 @@
           <p:nvPr/>
         </p:nvPicPr>
         <p:blipFill rotWithShape="1">
-          <a:blip r:embed="rId15">
+          <a:blip r:embed="rId16">
             <a:alphaModFix/>
           </a:blip>
           <a:srcRect/>
@@ -29498,6 +29534,7 @@
     <p:sldLayoutId id="2147483671" r:id="rId11"/>
     <p:sldLayoutId id="2147483672" r:id="rId12"/>
     <p:sldLayoutId id="2147483673" r:id="rId13"/>
+    <p:sldLayoutId id="2147483674" r:id="rId14"/>
   </p:sldLayoutIdLst>
   <p:hf sldNum="0" hdr="0" ftr="0" dt="0"/>
   <p:txStyles>
@@ -31550,6 +31587,1240 @@
   <p:cSld>
     <p:spTree>
       <p:nvGrpSpPr>
+        <p:cNvPr id="1" name=""/>
+        <p:cNvGrpSpPr/>
+        <p:nvPr/>
+      </p:nvGrpSpPr>
+      <p:grpSpPr>
+        <a:xfrm>
+          <a:off x="0" y="0"/>
+          <a:ext cx="0" cy="0"/>
+          <a:chOff x="0" y="0"/>
+          <a:chExt cx="0" cy="0"/>
+        </a:xfrm>
+      </p:grpSpPr>
+      <p:sp>
+        <p:nvSpPr>
+          <p:cNvPr id="62" name="TextShape 1"/>
+          <p:cNvSpPr txBox="1"/>
+          <p:nvPr/>
+        </p:nvSpPr>
+        <p:spPr>
+          <a:xfrm>
+            <a:off x="597240" y="174240"/>
+            <a:ext cx="8127720" cy="474480"/>
+          </a:xfrm>
+          <a:prstGeom prst="rect">
+            <a:avLst/>
+          </a:prstGeom>
+          <a:noFill/>
+          <a:ln>
+            <a:noFill/>
+          </a:ln>
+        </p:spPr>
+        <p:txBody>
+          <a:bodyPr lIns="0" tIns="0" rIns="0" bIns="0" anchor="ctr">
+            <a:noAutofit/>
+          </a:bodyPr>
+          <a:lstStyle/>
+          <a:p>
+            <a:pPr>
+              <a:lnSpc>
+                <a:spcPct val="100000"/>
+              </a:lnSpc>
+            </a:pPr>
+            <a:r>
+              <a:rPr lang="es-ES" sz="1870" b="1" strike="noStrike" spc="-1">
+                <a:solidFill>
+                  <a:srgbClr val="000000"/>
+                </a:solidFill>
+                <a:latin typeface="Raleway"/>
+                <a:ea typeface="Raleway"/>
+              </a:rPr>
+              <a:t>Proceso de ETL</a:t>
+            </a:r>
+            <a:endParaRPr lang="es-ES" sz="1870" b="0" strike="noStrike" spc="-1">
+              <a:solidFill>
+                <a:srgbClr val="000000"/>
+              </a:solidFill>
+              <a:latin typeface="Arial"/>
+            </a:endParaRPr>
+          </a:p>
+        </p:txBody>
+      </p:sp>
+      <p:sp>
+        <p:nvSpPr>
+          <p:cNvPr id="63" name="CustomShape 2"/>
+          <p:cNvSpPr/>
+          <p:nvPr/>
+        </p:nvSpPr>
+        <p:spPr>
+          <a:xfrm>
+            <a:off x="576000" y="936000"/>
+            <a:ext cx="2592000" cy="936000"/>
+          </a:xfrm>
+          <a:custGeom>
+            <a:avLst/>
+            <a:gdLst/>
+            <a:ahLst/>
+            <a:cxnLst/>
+            <a:rect l="0" t="0" r="r" b="b"/>
+            <a:pathLst>
+              <a:path w="7202" h="2602">
+                <a:moveTo>
+                  <a:pt x="433" y="0"/>
+                </a:moveTo>
+                <a:cubicBezTo>
+                  <a:pt x="216" y="0"/>
+                  <a:pt x="0" y="216"/>
+                  <a:pt x="0" y="433"/>
+                </a:cubicBezTo>
+                <a:lnTo>
+                  <a:pt x="0" y="2167"/>
+                </a:lnTo>
+                <a:cubicBezTo>
+                  <a:pt x="0" y="2384"/>
+                  <a:pt x="216" y="2601"/>
+                  <a:pt x="433" y="2601"/>
+                </a:cubicBezTo>
+                <a:lnTo>
+                  <a:pt x="6767" y="2601"/>
+                </a:lnTo>
+                <a:cubicBezTo>
+                  <a:pt x="6984" y="2601"/>
+                  <a:pt x="7201" y="2384"/>
+                  <a:pt x="7201" y="2167"/>
+                </a:cubicBezTo>
+                <a:lnTo>
+                  <a:pt x="7201" y="433"/>
+                </a:lnTo>
+                <a:cubicBezTo>
+                  <a:pt x="7201" y="216"/>
+                  <a:pt x="6984" y="0"/>
+                  <a:pt x="6767" y="0"/>
+                </a:cubicBezTo>
+                <a:lnTo>
+                  <a:pt x="433" y="0"/>
+                </a:lnTo>
+              </a:path>
+            </a:pathLst>
+          </a:custGeom>
+          <a:solidFill>
+            <a:srgbClr val="DEDCE6"/>
+          </a:solidFill>
+          <a:ln>
+            <a:solidFill>
+              <a:srgbClr val="3465A4"/>
+            </a:solidFill>
+          </a:ln>
+        </p:spPr>
+        <p:style>
+          <a:lnRef idx="0">
+            <a:scrgbClr r="0" g="0" b="0"/>
+          </a:lnRef>
+          <a:fillRef idx="0">
+            <a:scrgbClr r="0" g="0" b="0"/>
+          </a:fillRef>
+          <a:effectRef idx="0">
+            <a:scrgbClr r="0" g="0" b="0"/>
+          </a:effectRef>
+          <a:fontRef idx="minor"/>
+        </p:style>
+        <p:txBody>
+          <a:bodyPr wrap="none" lIns="90000" tIns="45000" rIns="90000" bIns="45000" anchor="ctr">
+            <a:noAutofit/>
+          </a:bodyPr>
+          <a:lstStyle/>
+          <a:p>
+            <a:pPr algn="ctr"/>
+            <a:r>
+              <a:rPr lang="es-AR" sz="1800" b="0" strike="noStrike" spc="-1">
+                <a:latin typeface="Arial"/>
+              </a:rPr>
+              <a:t>Dropeamos variables no </a:t>
+            </a:r>
+          </a:p>
+          <a:p>
+            <a:pPr algn="ctr"/>
+            <a:r>
+              <a:rPr lang="es-AR" sz="1800" b="0" strike="noStrike" spc="-1">
+                <a:latin typeface="Arial"/>
+              </a:rPr>
+              <a:t>interesantes</a:t>
+            </a:r>
+          </a:p>
+        </p:txBody>
+      </p:sp>
+      <p:sp>
+        <p:nvSpPr>
+          <p:cNvPr id="64" name="CustomShape 3"/>
+          <p:cNvSpPr/>
+          <p:nvPr/>
+        </p:nvSpPr>
+        <p:spPr>
+          <a:xfrm>
+            <a:off x="3312000" y="1224000"/>
+            <a:ext cx="792000" cy="288000"/>
+          </a:xfrm>
+          <a:custGeom>
+            <a:avLst/>
+            <a:gdLst/>
+            <a:ahLst/>
+            <a:cxnLst/>
+            <a:rect l="0" t="0" r="r" b="b"/>
+            <a:pathLst>
+              <a:path w="2202" h="802">
+                <a:moveTo>
+                  <a:pt x="0" y="200"/>
+                </a:moveTo>
+                <a:lnTo>
+                  <a:pt x="1650" y="200"/>
+                </a:lnTo>
+                <a:lnTo>
+                  <a:pt x="1650" y="0"/>
+                </a:lnTo>
+                <a:lnTo>
+                  <a:pt x="2201" y="400"/>
+                </a:lnTo>
+                <a:lnTo>
+                  <a:pt x="1650" y="801"/>
+                </a:lnTo>
+                <a:lnTo>
+                  <a:pt x="1650" y="600"/>
+                </a:lnTo>
+                <a:lnTo>
+                  <a:pt x="0" y="600"/>
+                </a:lnTo>
+                <a:lnTo>
+                  <a:pt x="0" y="200"/>
+                </a:lnTo>
+              </a:path>
+            </a:pathLst>
+          </a:custGeom>
+          <a:solidFill>
+            <a:srgbClr val="729FCF"/>
+          </a:solidFill>
+          <a:ln>
+            <a:solidFill>
+              <a:srgbClr val="3465A4"/>
+            </a:solidFill>
+          </a:ln>
+        </p:spPr>
+        <p:style>
+          <a:lnRef idx="0">
+            <a:scrgbClr r="0" g="0" b="0"/>
+          </a:lnRef>
+          <a:fillRef idx="0">
+            <a:scrgbClr r="0" g="0" b="0"/>
+          </a:fillRef>
+          <a:effectRef idx="0">
+            <a:scrgbClr r="0" g="0" b="0"/>
+          </a:effectRef>
+          <a:fontRef idx="minor"/>
+        </p:style>
+      </p:sp>
+      <p:sp>
+        <p:nvSpPr>
+          <p:cNvPr id="65" name="CustomShape 4"/>
+          <p:cNvSpPr/>
+          <p:nvPr/>
+        </p:nvSpPr>
+        <p:spPr>
+          <a:xfrm>
+            <a:off x="4176000" y="1008000"/>
+            <a:ext cx="3024000" cy="720000"/>
+          </a:xfrm>
+          <a:custGeom>
+            <a:avLst/>
+            <a:gdLst/>
+            <a:ahLst/>
+            <a:cxnLst/>
+            <a:rect l="0" t="0" r="r" b="b"/>
+            <a:pathLst>
+              <a:path w="8401" h="2002">
+                <a:moveTo>
+                  <a:pt x="333" y="0"/>
+                </a:moveTo>
+                <a:cubicBezTo>
+                  <a:pt x="166" y="0"/>
+                  <a:pt x="0" y="166"/>
+                  <a:pt x="0" y="333"/>
+                </a:cubicBezTo>
+                <a:lnTo>
+                  <a:pt x="0" y="1667"/>
+                </a:lnTo>
+                <a:cubicBezTo>
+                  <a:pt x="0" y="1834"/>
+                  <a:pt x="166" y="2001"/>
+                  <a:pt x="333" y="2001"/>
+                </a:cubicBezTo>
+                <a:lnTo>
+                  <a:pt x="8067" y="2001"/>
+                </a:lnTo>
+                <a:cubicBezTo>
+                  <a:pt x="8233" y="2001"/>
+                  <a:pt x="8400" y="1834"/>
+                  <a:pt x="8400" y="1667"/>
+                </a:cubicBezTo>
+                <a:lnTo>
+                  <a:pt x="8400" y="333"/>
+                </a:lnTo>
+                <a:cubicBezTo>
+                  <a:pt x="8400" y="166"/>
+                  <a:pt x="8233" y="0"/>
+                  <a:pt x="8067" y="0"/>
+                </a:cubicBezTo>
+                <a:lnTo>
+                  <a:pt x="333" y="0"/>
+                </a:lnTo>
+              </a:path>
+            </a:pathLst>
+          </a:custGeom>
+          <a:solidFill>
+            <a:srgbClr val="DEDCE6"/>
+          </a:solidFill>
+          <a:ln>
+            <a:solidFill>
+              <a:srgbClr val="3465A4"/>
+            </a:solidFill>
+          </a:ln>
+        </p:spPr>
+        <p:style>
+          <a:lnRef idx="0">
+            <a:scrgbClr r="0" g="0" b="0"/>
+          </a:lnRef>
+          <a:fillRef idx="0">
+            <a:scrgbClr r="0" g="0" b="0"/>
+          </a:fillRef>
+          <a:effectRef idx="0">
+            <a:scrgbClr r="0" g="0" b="0"/>
+          </a:effectRef>
+          <a:fontRef idx="minor"/>
+        </p:style>
+        <p:txBody>
+          <a:bodyPr wrap="none" lIns="90000" tIns="45000" rIns="90000" bIns="45000" anchor="ctr">
+            <a:noAutofit/>
+          </a:bodyPr>
+          <a:lstStyle/>
+          <a:p>
+            <a:pPr algn="ctr"/>
+            <a:r>
+              <a:rPr lang="es-AR" sz="1800" b="0" strike="noStrike" spc="-1">
+                <a:latin typeface="Arial"/>
+              </a:rPr>
+              <a:t>Recortamos DataSet a </a:t>
+            </a:r>
+          </a:p>
+          <a:p>
+            <a:pPr algn="ctr"/>
+            <a:r>
+              <a:rPr lang="es-AR" sz="1800" b="0" strike="noStrike" spc="-1">
+                <a:latin typeface="Arial"/>
+              </a:rPr>
+              <a:t>zona CABA</a:t>
+            </a:r>
+          </a:p>
+        </p:txBody>
+      </p:sp>
+      <p:sp>
+        <p:nvSpPr>
+          <p:cNvPr id="66" name="CustomShape 5"/>
+          <p:cNvSpPr/>
+          <p:nvPr/>
+        </p:nvSpPr>
+        <p:spPr>
+          <a:xfrm>
+            <a:off x="8784000" y="1008000"/>
+            <a:ext cx="2736000" cy="720000"/>
+          </a:xfrm>
+          <a:custGeom>
+            <a:avLst/>
+            <a:gdLst/>
+            <a:ahLst/>
+            <a:cxnLst/>
+            <a:rect l="0" t="0" r="r" b="b"/>
+            <a:pathLst>
+              <a:path w="7601" h="2002">
+                <a:moveTo>
+                  <a:pt x="333" y="0"/>
+                </a:moveTo>
+                <a:cubicBezTo>
+                  <a:pt x="166" y="0"/>
+                  <a:pt x="0" y="166"/>
+                  <a:pt x="0" y="333"/>
+                </a:cubicBezTo>
+                <a:lnTo>
+                  <a:pt x="0" y="1667"/>
+                </a:lnTo>
+                <a:cubicBezTo>
+                  <a:pt x="0" y="1834"/>
+                  <a:pt x="166" y="2001"/>
+                  <a:pt x="333" y="2001"/>
+                </a:cubicBezTo>
+                <a:lnTo>
+                  <a:pt x="7267" y="2001"/>
+                </a:lnTo>
+                <a:cubicBezTo>
+                  <a:pt x="7433" y="2001"/>
+                  <a:pt x="7600" y="1834"/>
+                  <a:pt x="7600" y="1667"/>
+                </a:cubicBezTo>
+                <a:lnTo>
+                  <a:pt x="7600" y="333"/>
+                </a:lnTo>
+                <a:cubicBezTo>
+                  <a:pt x="7600" y="166"/>
+                  <a:pt x="7433" y="0"/>
+                  <a:pt x="7267" y="0"/>
+                </a:cubicBezTo>
+                <a:lnTo>
+                  <a:pt x="333" y="0"/>
+                </a:lnTo>
+              </a:path>
+            </a:pathLst>
+          </a:custGeom>
+          <a:solidFill>
+            <a:srgbClr val="DEDCE6"/>
+          </a:solidFill>
+          <a:ln>
+            <a:solidFill>
+              <a:srgbClr val="3465A4"/>
+            </a:solidFill>
+          </a:ln>
+        </p:spPr>
+        <p:style>
+          <a:lnRef idx="0">
+            <a:scrgbClr r="0" g="0" b="0"/>
+          </a:lnRef>
+          <a:fillRef idx="0">
+            <a:scrgbClr r="0" g="0" b="0"/>
+          </a:fillRef>
+          <a:effectRef idx="0">
+            <a:scrgbClr r="0" g="0" b="0"/>
+          </a:effectRef>
+          <a:fontRef idx="minor"/>
+        </p:style>
+        <p:txBody>
+          <a:bodyPr wrap="none" lIns="90000" tIns="45000" rIns="90000" bIns="45000" anchor="ctr">
+            <a:noAutofit/>
+          </a:bodyPr>
+          <a:lstStyle/>
+          <a:p>
+            <a:pPr algn="ctr"/>
+            <a:r>
+              <a:rPr lang="es-AR" sz="1800" b="0" strike="noStrike" spc="-1">
+                <a:latin typeface="Arial"/>
+              </a:rPr>
+              <a:t>Imputamos sup.m² totales</a:t>
+            </a:r>
+          </a:p>
+        </p:txBody>
+      </p:sp>
+      <p:sp>
+        <p:nvSpPr>
+          <p:cNvPr id="67" name="CustomShape 6"/>
+          <p:cNvSpPr/>
+          <p:nvPr/>
+        </p:nvSpPr>
+        <p:spPr>
+          <a:xfrm>
+            <a:off x="7488000" y="1224000"/>
+            <a:ext cx="1080000" cy="288000"/>
+          </a:xfrm>
+          <a:custGeom>
+            <a:avLst/>
+            <a:gdLst/>
+            <a:ahLst/>
+            <a:cxnLst/>
+            <a:rect l="0" t="0" r="r" b="b"/>
+            <a:pathLst>
+              <a:path w="3002" h="802">
+                <a:moveTo>
+                  <a:pt x="0" y="200"/>
+                </a:moveTo>
+                <a:lnTo>
+                  <a:pt x="2250" y="200"/>
+                </a:lnTo>
+                <a:lnTo>
+                  <a:pt x="2250" y="0"/>
+                </a:lnTo>
+                <a:lnTo>
+                  <a:pt x="3001" y="400"/>
+                </a:lnTo>
+                <a:lnTo>
+                  <a:pt x="2250" y="801"/>
+                </a:lnTo>
+                <a:lnTo>
+                  <a:pt x="2250" y="600"/>
+                </a:lnTo>
+                <a:lnTo>
+                  <a:pt x="0" y="600"/>
+                </a:lnTo>
+                <a:lnTo>
+                  <a:pt x="0" y="200"/>
+                </a:lnTo>
+              </a:path>
+            </a:pathLst>
+          </a:custGeom>
+          <a:solidFill>
+            <a:srgbClr val="729FCF"/>
+          </a:solidFill>
+          <a:ln>
+            <a:solidFill>
+              <a:srgbClr val="3465A4"/>
+            </a:solidFill>
+          </a:ln>
+        </p:spPr>
+        <p:style>
+          <a:lnRef idx="0">
+            <a:scrgbClr r="0" g="0" b="0"/>
+          </a:lnRef>
+          <a:fillRef idx="0">
+            <a:scrgbClr r="0" g="0" b="0"/>
+          </a:fillRef>
+          <a:effectRef idx="0">
+            <a:scrgbClr r="0" g="0" b="0"/>
+          </a:effectRef>
+          <a:fontRef idx="minor"/>
+        </p:style>
+      </p:sp>
+      <p:sp>
+        <p:nvSpPr>
+          <p:cNvPr id="68" name="CustomShape 7"/>
+          <p:cNvSpPr/>
+          <p:nvPr/>
+        </p:nvSpPr>
+        <p:spPr>
+          <a:xfrm>
+            <a:off x="9792000" y="1872000"/>
+            <a:ext cx="288000" cy="648000"/>
+          </a:xfrm>
+          <a:custGeom>
+            <a:avLst/>
+            <a:gdLst/>
+            <a:ahLst/>
+            <a:cxnLst/>
+            <a:rect l="0" t="0" r="r" b="b"/>
+            <a:pathLst>
+              <a:path w="802" h="1801">
+                <a:moveTo>
+                  <a:pt x="200" y="0"/>
+                </a:moveTo>
+                <a:lnTo>
+                  <a:pt x="200" y="1350"/>
+                </a:lnTo>
+                <a:lnTo>
+                  <a:pt x="0" y="1350"/>
+                </a:lnTo>
+                <a:lnTo>
+                  <a:pt x="400" y="1800"/>
+                </a:lnTo>
+                <a:lnTo>
+                  <a:pt x="801" y="1350"/>
+                </a:lnTo>
+                <a:lnTo>
+                  <a:pt x="600" y="1350"/>
+                </a:lnTo>
+                <a:lnTo>
+                  <a:pt x="600" y="0"/>
+                </a:lnTo>
+                <a:lnTo>
+                  <a:pt x="200" y="0"/>
+                </a:lnTo>
+              </a:path>
+            </a:pathLst>
+          </a:custGeom>
+          <a:solidFill>
+            <a:srgbClr val="729FCF"/>
+          </a:solidFill>
+          <a:ln>
+            <a:solidFill>
+              <a:srgbClr val="3465A4"/>
+            </a:solidFill>
+          </a:ln>
+        </p:spPr>
+        <p:style>
+          <a:lnRef idx="0">
+            <a:scrgbClr r="0" g="0" b="0"/>
+          </a:lnRef>
+          <a:fillRef idx="0">
+            <a:scrgbClr r="0" g="0" b="0"/>
+          </a:fillRef>
+          <a:effectRef idx="0">
+            <a:scrgbClr r="0" g="0" b="0"/>
+          </a:effectRef>
+          <a:fontRef idx="minor"/>
+        </p:style>
+      </p:sp>
+      <p:sp>
+        <p:nvSpPr>
+          <p:cNvPr id="69" name="CustomShape 8"/>
+          <p:cNvSpPr/>
+          <p:nvPr/>
+        </p:nvSpPr>
+        <p:spPr>
+          <a:xfrm>
+            <a:off x="8712000" y="2664000"/>
+            <a:ext cx="3096000" cy="720000"/>
+          </a:xfrm>
+          <a:custGeom>
+            <a:avLst/>
+            <a:gdLst/>
+            <a:ahLst/>
+            <a:cxnLst/>
+            <a:rect l="0" t="0" r="r" b="b"/>
+            <a:pathLst>
+              <a:path w="8602" h="2002">
+                <a:moveTo>
+                  <a:pt x="333" y="0"/>
+                </a:moveTo>
+                <a:cubicBezTo>
+                  <a:pt x="166" y="0"/>
+                  <a:pt x="0" y="166"/>
+                  <a:pt x="0" y="333"/>
+                </a:cubicBezTo>
+                <a:lnTo>
+                  <a:pt x="0" y="1667"/>
+                </a:lnTo>
+                <a:cubicBezTo>
+                  <a:pt x="0" y="1834"/>
+                  <a:pt x="166" y="2001"/>
+                  <a:pt x="333" y="2001"/>
+                </a:cubicBezTo>
+                <a:lnTo>
+                  <a:pt x="8267" y="2001"/>
+                </a:lnTo>
+                <a:cubicBezTo>
+                  <a:pt x="8434" y="2001"/>
+                  <a:pt x="8601" y="1834"/>
+                  <a:pt x="8601" y="1667"/>
+                </a:cubicBezTo>
+                <a:lnTo>
+                  <a:pt x="8601" y="333"/>
+                </a:lnTo>
+                <a:cubicBezTo>
+                  <a:pt x="8601" y="166"/>
+                  <a:pt x="8434" y="0"/>
+                  <a:pt x="8267" y="0"/>
+                </a:cubicBezTo>
+                <a:lnTo>
+                  <a:pt x="333" y="0"/>
+                </a:lnTo>
+              </a:path>
+            </a:pathLst>
+          </a:custGeom>
+          <a:solidFill>
+            <a:srgbClr val="DEDCE6"/>
+          </a:solidFill>
+          <a:ln>
+            <a:solidFill>
+              <a:srgbClr val="3465A4"/>
+            </a:solidFill>
+          </a:ln>
+        </p:spPr>
+        <p:style>
+          <a:lnRef idx="0">
+            <a:scrgbClr r="0" g="0" b="0"/>
+          </a:lnRef>
+          <a:fillRef idx="0">
+            <a:scrgbClr r="0" g="0" b="0"/>
+          </a:fillRef>
+          <a:effectRef idx="0">
+            <a:scrgbClr r="0" g="0" b="0"/>
+          </a:effectRef>
+          <a:fontRef idx="minor"/>
+        </p:style>
+        <p:txBody>
+          <a:bodyPr wrap="none" lIns="90000" tIns="45000" rIns="90000" bIns="45000" anchor="ctr">
+            <a:noAutofit/>
+          </a:bodyPr>
+          <a:lstStyle/>
+          <a:p>
+            <a:pPr algn="ctr"/>
+            <a:r>
+              <a:rPr lang="es-AR" sz="1800" b="0" strike="noStrike" spc="-1">
+                <a:latin typeface="Arial"/>
+              </a:rPr>
+              <a:t>Imputamos precio y moneda</a:t>
+            </a:r>
+          </a:p>
+        </p:txBody>
+      </p:sp>
+      <p:sp>
+        <p:nvSpPr>
+          <p:cNvPr id="70" name="CustomShape 9"/>
+          <p:cNvSpPr/>
+          <p:nvPr/>
+        </p:nvSpPr>
+        <p:spPr>
+          <a:xfrm>
+            <a:off x="4608000" y="2664000"/>
+            <a:ext cx="3096000" cy="720000"/>
+          </a:xfrm>
+          <a:custGeom>
+            <a:avLst/>
+            <a:gdLst/>
+            <a:ahLst/>
+            <a:cxnLst/>
+            <a:rect l="0" t="0" r="r" b="b"/>
+            <a:pathLst>
+              <a:path w="8602" h="2002">
+                <a:moveTo>
+                  <a:pt x="333" y="0"/>
+                </a:moveTo>
+                <a:cubicBezTo>
+                  <a:pt x="166" y="0"/>
+                  <a:pt x="0" y="166"/>
+                  <a:pt x="0" y="333"/>
+                </a:cubicBezTo>
+                <a:lnTo>
+                  <a:pt x="0" y="1667"/>
+                </a:lnTo>
+                <a:cubicBezTo>
+                  <a:pt x="0" y="1834"/>
+                  <a:pt x="166" y="2001"/>
+                  <a:pt x="333" y="2001"/>
+                </a:cubicBezTo>
+                <a:lnTo>
+                  <a:pt x="8267" y="2001"/>
+                </a:lnTo>
+                <a:cubicBezTo>
+                  <a:pt x="8434" y="2001"/>
+                  <a:pt x="8601" y="1834"/>
+                  <a:pt x="8601" y="1667"/>
+                </a:cubicBezTo>
+                <a:lnTo>
+                  <a:pt x="8601" y="333"/>
+                </a:lnTo>
+                <a:cubicBezTo>
+                  <a:pt x="8601" y="166"/>
+                  <a:pt x="8434" y="0"/>
+                  <a:pt x="8267" y="0"/>
+                </a:cubicBezTo>
+                <a:lnTo>
+                  <a:pt x="333" y="0"/>
+                </a:lnTo>
+              </a:path>
+            </a:pathLst>
+          </a:custGeom>
+          <a:solidFill>
+            <a:srgbClr val="DEDCE6"/>
+          </a:solidFill>
+          <a:ln>
+            <a:solidFill>
+              <a:srgbClr val="3465A4"/>
+            </a:solidFill>
+          </a:ln>
+        </p:spPr>
+        <p:style>
+          <a:lnRef idx="0">
+            <a:scrgbClr r="0" g="0" b="0"/>
+          </a:lnRef>
+          <a:fillRef idx="0">
+            <a:scrgbClr r="0" g="0" b="0"/>
+          </a:fillRef>
+          <a:effectRef idx="0">
+            <a:scrgbClr r="0" g="0" b="0"/>
+          </a:effectRef>
+          <a:fontRef idx="minor"/>
+        </p:style>
+        <p:txBody>
+          <a:bodyPr wrap="none" lIns="90000" tIns="45000" rIns="90000" bIns="45000" anchor="ctr">
+            <a:noAutofit/>
+          </a:bodyPr>
+          <a:lstStyle/>
+          <a:p>
+            <a:pPr algn="ctr"/>
+            <a:r>
+              <a:rPr lang="es-AR" sz="1800" b="0" strike="noStrike" spc="-1">
+                <a:latin typeface="Arial"/>
+              </a:rPr>
+              <a:t>Filtramos outliers en campos </a:t>
+            </a:r>
+          </a:p>
+          <a:p>
+            <a:pPr algn="ctr"/>
+            <a:r>
+              <a:rPr lang="es-AR" sz="1800" b="0" strike="noStrike" spc="-1">
+                <a:latin typeface="Arial"/>
+              </a:rPr>
+              <a:t>sup.m2 y precio</a:t>
+            </a:r>
+          </a:p>
+        </p:txBody>
+      </p:sp>
+      <p:sp>
+        <p:nvSpPr>
+          <p:cNvPr id="71" name="CustomShape 10"/>
+          <p:cNvSpPr/>
+          <p:nvPr/>
+        </p:nvSpPr>
+        <p:spPr>
+          <a:xfrm>
+            <a:off x="7704000" y="2880000"/>
+            <a:ext cx="864000" cy="288000"/>
+          </a:xfrm>
+          <a:custGeom>
+            <a:avLst/>
+            <a:gdLst/>
+            <a:ahLst/>
+            <a:cxnLst/>
+            <a:rect l="0" t="0" r="r" b="b"/>
+            <a:pathLst>
+              <a:path w="2402" h="802">
+                <a:moveTo>
+                  <a:pt x="2401" y="200"/>
+                </a:moveTo>
+                <a:lnTo>
+                  <a:pt x="600" y="200"/>
+                </a:lnTo>
+                <a:lnTo>
+                  <a:pt x="600" y="0"/>
+                </a:lnTo>
+                <a:lnTo>
+                  <a:pt x="0" y="400"/>
+                </a:lnTo>
+                <a:lnTo>
+                  <a:pt x="600" y="801"/>
+                </a:lnTo>
+                <a:lnTo>
+                  <a:pt x="600" y="600"/>
+                </a:lnTo>
+                <a:lnTo>
+                  <a:pt x="2401" y="600"/>
+                </a:lnTo>
+                <a:lnTo>
+                  <a:pt x="2401" y="200"/>
+                </a:lnTo>
+              </a:path>
+            </a:pathLst>
+          </a:custGeom>
+          <a:solidFill>
+            <a:srgbClr val="729FCF"/>
+          </a:solidFill>
+          <a:ln>
+            <a:solidFill>
+              <a:srgbClr val="3465A4"/>
+            </a:solidFill>
+          </a:ln>
+        </p:spPr>
+        <p:style>
+          <a:lnRef idx="0">
+            <a:scrgbClr r="0" g="0" b="0"/>
+          </a:lnRef>
+          <a:fillRef idx="0">
+            <a:scrgbClr r="0" g="0" b="0"/>
+          </a:fillRef>
+          <a:effectRef idx="0">
+            <a:scrgbClr r="0" g="0" b="0"/>
+          </a:effectRef>
+          <a:fontRef idx="minor"/>
+        </p:style>
+      </p:sp>
+      <p:sp>
+        <p:nvSpPr>
+          <p:cNvPr id="72" name="CustomShape 11"/>
+          <p:cNvSpPr/>
+          <p:nvPr/>
+        </p:nvSpPr>
+        <p:spPr>
+          <a:xfrm>
+            <a:off x="504000" y="2664000"/>
+            <a:ext cx="3096000" cy="720000"/>
+          </a:xfrm>
+          <a:custGeom>
+            <a:avLst/>
+            <a:gdLst/>
+            <a:ahLst/>
+            <a:cxnLst/>
+            <a:rect l="0" t="0" r="r" b="b"/>
+            <a:pathLst>
+              <a:path w="8602" h="2002">
+                <a:moveTo>
+                  <a:pt x="333" y="0"/>
+                </a:moveTo>
+                <a:cubicBezTo>
+                  <a:pt x="166" y="0"/>
+                  <a:pt x="0" y="166"/>
+                  <a:pt x="0" y="333"/>
+                </a:cubicBezTo>
+                <a:lnTo>
+                  <a:pt x="0" y="1667"/>
+                </a:lnTo>
+                <a:cubicBezTo>
+                  <a:pt x="0" y="1834"/>
+                  <a:pt x="166" y="2001"/>
+                  <a:pt x="333" y="2001"/>
+                </a:cubicBezTo>
+                <a:lnTo>
+                  <a:pt x="8267" y="2001"/>
+                </a:lnTo>
+                <a:cubicBezTo>
+                  <a:pt x="8434" y="2001"/>
+                  <a:pt x="8601" y="1834"/>
+                  <a:pt x="8601" y="1667"/>
+                </a:cubicBezTo>
+                <a:lnTo>
+                  <a:pt x="8601" y="333"/>
+                </a:lnTo>
+                <a:cubicBezTo>
+                  <a:pt x="8601" y="166"/>
+                  <a:pt x="8434" y="0"/>
+                  <a:pt x="8267" y="0"/>
+                </a:cubicBezTo>
+                <a:lnTo>
+                  <a:pt x="333" y="0"/>
+                </a:lnTo>
+              </a:path>
+            </a:pathLst>
+          </a:custGeom>
+          <a:solidFill>
+            <a:srgbClr val="DEDCE6"/>
+          </a:solidFill>
+          <a:ln>
+            <a:solidFill>
+              <a:srgbClr val="3465A4"/>
+            </a:solidFill>
+          </a:ln>
+        </p:spPr>
+        <p:style>
+          <a:lnRef idx="0">
+            <a:scrgbClr r="0" g="0" b="0"/>
+          </a:lnRef>
+          <a:fillRef idx="0">
+            <a:scrgbClr r="0" g="0" b="0"/>
+          </a:fillRef>
+          <a:effectRef idx="0">
+            <a:scrgbClr r="0" g="0" b="0"/>
+          </a:effectRef>
+          <a:fontRef idx="minor"/>
+        </p:style>
+        <p:txBody>
+          <a:bodyPr wrap="none" lIns="90000" tIns="45000" rIns="90000" bIns="45000" anchor="ctr">
+            <a:noAutofit/>
+          </a:bodyPr>
+          <a:lstStyle/>
+          <a:p>
+            <a:pPr algn="ctr"/>
+            <a:r>
+              <a:rPr lang="es-AR" sz="1800" b="0" strike="noStrike" spc="-1">
+                <a:latin typeface="Arial"/>
+              </a:rPr>
+              <a:t>Imputamos Latitud y Longitud </a:t>
+            </a:r>
+          </a:p>
+          <a:p>
+            <a:pPr algn="ctr"/>
+            <a:r>
+              <a:rPr lang="es-AR" sz="1800" b="0" strike="noStrike" spc="-1">
+                <a:latin typeface="Arial"/>
+              </a:rPr>
+              <a:t>a partir de columna Lat-Lon</a:t>
+            </a:r>
+          </a:p>
+        </p:txBody>
+      </p:sp>
+      <p:sp>
+        <p:nvSpPr>
+          <p:cNvPr id="73" name="CustomShape 12"/>
+          <p:cNvSpPr/>
+          <p:nvPr/>
+        </p:nvSpPr>
+        <p:spPr>
+          <a:xfrm>
+            <a:off x="1944000" y="3600000"/>
+            <a:ext cx="288000" cy="576000"/>
+          </a:xfrm>
+          <a:custGeom>
+            <a:avLst/>
+            <a:gdLst/>
+            <a:ahLst/>
+            <a:cxnLst/>
+            <a:rect l="0" t="0" r="r" b="b"/>
+            <a:pathLst>
+              <a:path w="802" h="1601">
+                <a:moveTo>
+                  <a:pt x="200" y="0"/>
+                </a:moveTo>
+                <a:lnTo>
+                  <a:pt x="200" y="1200"/>
+                </a:lnTo>
+                <a:lnTo>
+                  <a:pt x="0" y="1200"/>
+                </a:lnTo>
+                <a:lnTo>
+                  <a:pt x="400" y="1600"/>
+                </a:lnTo>
+                <a:lnTo>
+                  <a:pt x="801" y="1200"/>
+                </a:lnTo>
+                <a:lnTo>
+                  <a:pt x="600" y="1200"/>
+                </a:lnTo>
+                <a:lnTo>
+                  <a:pt x="600" y="0"/>
+                </a:lnTo>
+                <a:lnTo>
+                  <a:pt x="200" y="0"/>
+                </a:lnTo>
+              </a:path>
+            </a:pathLst>
+          </a:custGeom>
+          <a:solidFill>
+            <a:srgbClr val="729FCF"/>
+          </a:solidFill>
+          <a:ln>
+            <a:solidFill>
+              <a:srgbClr val="3465A4"/>
+            </a:solidFill>
+          </a:ln>
+        </p:spPr>
+        <p:style>
+          <a:lnRef idx="0">
+            <a:scrgbClr r="0" g="0" b="0"/>
+          </a:lnRef>
+          <a:fillRef idx="0">
+            <a:scrgbClr r="0" g="0" b="0"/>
+          </a:fillRef>
+          <a:effectRef idx="0">
+            <a:scrgbClr r="0" g="0" b="0"/>
+          </a:effectRef>
+          <a:fontRef idx="minor"/>
+        </p:style>
+      </p:sp>
+      <p:sp>
+        <p:nvSpPr>
+          <p:cNvPr id="74" name="CustomShape 13"/>
+          <p:cNvSpPr/>
+          <p:nvPr/>
+        </p:nvSpPr>
+        <p:spPr>
+          <a:xfrm>
+            <a:off x="3672000" y="2880000"/>
+            <a:ext cx="864000" cy="288000"/>
+          </a:xfrm>
+          <a:custGeom>
+            <a:avLst/>
+            <a:gdLst/>
+            <a:ahLst/>
+            <a:cxnLst/>
+            <a:rect l="0" t="0" r="r" b="b"/>
+            <a:pathLst>
+              <a:path w="2402" h="802">
+                <a:moveTo>
+                  <a:pt x="2401" y="200"/>
+                </a:moveTo>
+                <a:lnTo>
+                  <a:pt x="600" y="200"/>
+                </a:lnTo>
+                <a:lnTo>
+                  <a:pt x="600" y="0"/>
+                </a:lnTo>
+                <a:lnTo>
+                  <a:pt x="0" y="400"/>
+                </a:lnTo>
+                <a:lnTo>
+                  <a:pt x="600" y="801"/>
+                </a:lnTo>
+                <a:lnTo>
+                  <a:pt x="600" y="600"/>
+                </a:lnTo>
+                <a:lnTo>
+                  <a:pt x="2401" y="600"/>
+                </a:lnTo>
+                <a:lnTo>
+                  <a:pt x="2401" y="200"/>
+                </a:lnTo>
+              </a:path>
+            </a:pathLst>
+          </a:custGeom>
+          <a:solidFill>
+            <a:srgbClr val="729FCF"/>
+          </a:solidFill>
+          <a:ln>
+            <a:solidFill>
+              <a:srgbClr val="3465A4"/>
+            </a:solidFill>
+          </a:ln>
+        </p:spPr>
+        <p:style>
+          <a:lnRef idx="0">
+            <a:scrgbClr r="0" g="0" b="0"/>
+          </a:lnRef>
+          <a:fillRef idx="0">
+            <a:scrgbClr r="0" g="0" b="0"/>
+          </a:fillRef>
+          <a:effectRef idx="0">
+            <a:scrgbClr r="0" g="0" b="0"/>
+          </a:effectRef>
+          <a:fontRef idx="minor"/>
+        </p:style>
+      </p:sp>
+      <p:sp>
+        <p:nvSpPr>
+          <p:cNvPr id="75" name="CustomShape 14"/>
+          <p:cNvSpPr/>
+          <p:nvPr/>
+        </p:nvSpPr>
+        <p:spPr>
+          <a:xfrm>
+            <a:off x="504000" y="4320000"/>
+            <a:ext cx="3384000" cy="1080000"/>
+          </a:xfrm>
+          <a:custGeom>
+            <a:avLst/>
+            <a:gdLst/>
+            <a:ahLst/>
+            <a:cxnLst/>
+            <a:rect l="0" t="0" r="r" b="b"/>
+            <a:pathLst>
+              <a:path w="9402" h="3002">
+                <a:moveTo>
+                  <a:pt x="500" y="0"/>
+                </a:moveTo>
+                <a:cubicBezTo>
+                  <a:pt x="250" y="0"/>
+                  <a:pt x="0" y="250"/>
+                  <a:pt x="0" y="500"/>
+                </a:cubicBezTo>
+                <a:lnTo>
+                  <a:pt x="0" y="2500"/>
+                </a:lnTo>
+                <a:cubicBezTo>
+                  <a:pt x="0" y="2750"/>
+                  <a:pt x="250" y="3001"/>
+                  <a:pt x="500" y="3001"/>
+                </a:cubicBezTo>
+                <a:lnTo>
+                  <a:pt x="8900" y="3001"/>
+                </a:lnTo>
+                <a:cubicBezTo>
+                  <a:pt x="9150" y="3001"/>
+                  <a:pt x="9401" y="2750"/>
+                  <a:pt x="9401" y="2500"/>
+                </a:cubicBezTo>
+                <a:lnTo>
+                  <a:pt x="9401" y="500"/>
+                </a:lnTo>
+                <a:cubicBezTo>
+                  <a:pt x="9401" y="250"/>
+                  <a:pt x="9150" y="0"/>
+                  <a:pt x="8900" y="0"/>
+                </a:cubicBezTo>
+                <a:lnTo>
+                  <a:pt x="500" y="0"/>
+                </a:lnTo>
+              </a:path>
+            </a:pathLst>
+          </a:custGeom>
+          <a:solidFill>
+            <a:srgbClr val="DEDCE6"/>
+          </a:solidFill>
+          <a:ln>
+            <a:solidFill>
+              <a:srgbClr val="3465A4"/>
+            </a:solidFill>
+          </a:ln>
+        </p:spPr>
+        <p:style>
+          <a:lnRef idx="0">
+            <a:scrgbClr r="0" g="0" b="0"/>
+          </a:lnRef>
+          <a:fillRef idx="0">
+            <a:scrgbClr r="0" g="0" b="0"/>
+          </a:fillRef>
+          <a:effectRef idx="0">
+            <a:scrgbClr r="0" g="0" b="0"/>
+          </a:effectRef>
+          <a:fontRef idx="minor"/>
+        </p:style>
+        <p:txBody>
+          <a:bodyPr wrap="none" lIns="90000" tIns="45000" rIns="90000" bIns="45000" anchor="ctr">
+            <a:noAutofit/>
+          </a:bodyPr>
+          <a:lstStyle/>
+          <a:p>
+            <a:pPr algn="ctr"/>
+            <a:r>
+              <a:rPr lang="es-AR" sz="1800" b="0" strike="noStrike" spc="-1">
+                <a:latin typeface="Arial"/>
+              </a:rPr>
+              <a:t>Creamos variables numéricas </a:t>
+            </a:r>
+          </a:p>
+          <a:p>
+            <a:pPr algn="ctr"/>
+            <a:r>
+              <a:rPr lang="es-AR" sz="1800" b="0" strike="noStrike" spc="-1">
+                <a:latin typeface="Arial"/>
+              </a:rPr>
+              <a:t>a partir de categóricas </a:t>
+            </a:r>
+          </a:p>
+          <a:p>
+            <a:pPr algn="ctr"/>
+            <a:r>
+              <a:rPr lang="es-AR" sz="1800" b="0" strike="noStrike" spc="-1">
+                <a:latin typeface="Arial"/>
+              </a:rPr>
+              <a:t>para modelos de Data Science</a:t>
+            </a:r>
+          </a:p>
+        </p:txBody>
+      </p:sp>
+    </p:spTree>
+    <p:extLst>
+      <p:ext uri="{BB962C8B-B14F-4D97-AF65-F5344CB8AC3E}">
+        <p14:creationId xmlns:p14="http://schemas.microsoft.com/office/powerpoint/2010/main" val="951797290"/>
+      </p:ext>
+    </p:extLst>
+  </p:cSld>
+  <p:clrMapOvr>
+    <a:masterClrMapping/>
+  </p:clrMapOvr>
+  <mc:AlternateContent xmlns:mc="http://schemas.openxmlformats.org/markup-compatibility/2006" xmlns:p14="http://schemas.microsoft.com/office/powerpoint/2010/main">
+    <mc:Choice Requires="p14">
+      <p:transition spd="slow" p14:dur="2000"/>
+    </mc:Choice>
+    <mc:Fallback xmlns:p15="http://schemas.microsoft.com/office/powerpoint/2012/main" xmlns="">
+      <p:transition spd="slow"/>
+    </mc:Fallback>
+  </mc:AlternateContent>
+  <p:timing>
+    <p:tnLst>
+      <p:par>
+        <p:cTn id="1" dur="indefinite" restart="never" nodeType="tmRoot">
+          <p:childTnLst>
+            <p:seq>
+              <p:cTn id="2" dur="indefinite" nodeType="mainSeq"/>
+              <p:prevCondLst>
+                <p:cond evt="onPrev" delay="0">
+                  <p:tgtEl>
+                    <p:sldTgt/>
+                  </p:tgtEl>
+                </p:cond>
+              </p:prevCondLst>
+              <p:nextCondLst>
+                <p:cond evt="onNext" delay="0">
+                  <p:tgtEl>
+                    <p:sldTgt/>
+                  </p:tgtEl>
+                </p:cond>
+              </p:nextCondLst>
+            </p:seq>
+          </p:childTnLst>
+        </p:cTn>
+      </p:par>
+    </p:tnLst>
+  </p:timing>
+</p:sld>
+</file>
+
+<file path=ppt/slides/slide5.xml><?xml version="1.0" encoding="utf-8"?>
+<p:sld xmlns:a="http://schemas.openxmlformats.org/drawingml/2006/main" xmlns:r="http://schemas.openxmlformats.org/officeDocument/2006/relationships" xmlns:p="http://schemas.openxmlformats.org/presentationml/2006/main">
+  <p:cSld>
+    <p:spTree>
+      <p:nvGrpSpPr>
         <p:cNvPr id="1" name="Shape 1081"/>
         <p:cNvGrpSpPr/>
         <p:nvPr/>
@@ -31631,7 +32902,7 @@
             <a:fld id="{00000000-1234-1234-1234-123412341234}" type="slidenum">
               <a:rPr lang="es"/>
               <a:pPr/>
-              <a:t>4</a:t>
+              <a:t>5</a:t>
             </a:fld>
             <a:endParaRPr/>
           </a:p>
@@ -32266,7 +33537,7 @@
 </p:sld>
 </file>
 
-<file path=ppt/slides/slide5.xml><?xml version="1.0" encoding="utf-8"?>
+<file path=ppt/slides/slide6.xml><?xml version="1.0" encoding="utf-8"?>
 <p:sld xmlns:a="http://schemas.openxmlformats.org/drawingml/2006/main" xmlns:r="http://schemas.openxmlformats.org/officeDocument/2006/relationships" xmlns:p="http://schemas.openxmlformats.org/presentationml/2006/main">
   <p:cSld>
     <p:spTree>
@@ -32352,7 +33623,7 @@
             <a:fld id="{00000000-1234-1234-1234-123412341234}" type="slidenum">
               <a:rPr lang="es"/>
               <a:pPr/>
-              <a:t>5</a:t>
+              <a:t>6</a:t>
             </a:fld>
             <a:endParaRPr/>
           </a:p>
@@ -32408,8 +33679,8 @@
         </p:blipFill>
         <p:spPr>
           <a:xfrm>
-            <a:off x="343409" y="1985348"/>
-            <a:ext cx="5368971" cy="3978723"/>
+            <a:off x="404446" y="1985348"/>
+            <a:ext cx="5307935" cy="3984629"/>
           </a:xfrm>
           <a:prstGeom prst="rect">
             <a:avLst/>
@@ -32990,7 +34261,7 @@
 </p:sld>
 </file>
 
-<file path=ppt/slides/slide6.xml><?xml version="1.0" encoding="utf-8"?>
+<file path=ppt/slides/slide7.xml><?xml version="1.0" encoding="utf-8"?>
 <p:sld xmlns:a="http://schemas.openxmlformats.org/drawingml/2006/main" xmlns:r="http://schemas.openxmlformats.org/officeDocument/2006/relationships" xmlns:p="http://schemas.openxmlformats.org/presentationml/2006/main">
   <p:cSld>
     <p:spTree>
@@ -33076,7 +34347,7 @@
             <a:fld id="{00000000-1234-1234-1234-123412341234}" type="slidenum">
               <a:rPr lang="es"/>
               <a:pPr/>
-              <a:t>6</a:t>
+              <a:t>7</a:t>
             </a:fld>
             <a:endParaRPr/>
           </a:p>
@@ -33703,7 +34974,7 @@
 </p:sld>
 </file>
 
-<file path=ppt/slides/slide7.xml><?xml version="1.0" encoding="utf-8"?>
+<file path=ppt/slides/slide8.xml><?xml version="1.0" encoding="utf-8"?>
 <p:sld xmlns:a="http://schemas.openxmlformats.org/drawingml/2006/main" xmlns:r="http://schemas.openxmlformats.org/officeDocument/2006/relationships" xmlns:p="http://schemas.openxmlformats.org/presentationml/2006/main">
   <p:cSld>
     <p:spTree>

</xml_diff>